<commit_message>
Update Microservice Cluster Architecture
</commit_message>
<xml_diff>
--- a/微服务集群架构.pptx
+++ b/微服务集群架构.pptx
@@ -105,6 +105,11 @@
       </a:defRPr>
     </a:lvl9pPr>
   </p:defaultTextStyle>
+  <p:extLst>
+    <p:ext uri="{EFAFB233-063F-42B5-8137-9DF3F51BA10A}">
+      <p15:sldGuideLst xmlns:p15="http://schemas.microsoft.com/office/powerpoint/2012/main"/>
+    </p:ext>
+  </p:extLst>
 </p:presentation>
 </file>
 
@@ -4914,7 +4919,7 @@
             <a:pPr algn="ctr"/>
             <a:r>
               <a:rPr lang="zh-CN" altLang="en-US" dirty="0"/>
-              <a:t>选择器</a:t>
+              <a:t>网关</a:t>
             </a:r>
           </a:p>
         </p:txBody>
@@ -5087,8 +5092,8 @@
         </p:nvSpPr>
         <p:spPr>
           <a:xfrm>
-            <a:off x="9234443" y="2888868"/>
-            <a:ext cx="1706084" cy="1323439"/>
+            <a:off x="8413403" y="2929841"/>
+            <a:ext cx="3349003" cy="3046988"/>
           </a:xfrm>
           <a:prstGeom prst="rect">
             <a:avLst/>
@@ -5103,7 +5108,63 @@
           <a:p>
             <a:r>
               <a:rPr lang="zh-CN" altLang="en-US" sz="1600" dirty="0"/>
-              <a:t>选择器之间直连</a:t>
+              <a:t>说明：</a:t>
+            </a:r>
+            <a:endParaRPr lang="en-US" altLang="zh-CN" sz="1600" dirty="0"/>
+          </a:p>
+          <a:p>
+            <a:r>
+              <a:rPr lang="zh-CN" altLang="en-US" sz="1600" dirty="0"/>
+              <a:t>网关之间直连，动态调整微服务数量。</a:t>
+            </a:r>
+            <a:endParaRPr lang="en-US" altLang="zh-CN" sz="1600" dirty="0"/>
+          </a:p>
+          <a:p>
+            <a:r>
+              <a:rPr lang="zh-CN" altLang="en-US" sz="1600" dirty="0"/>
+              <a:t>以名称</a:t>
+            </a:r>
+            <a:r>
+              <a:rPr lang="en-US" altLang="zh-CN" sz="1600" dirty="0"/>
+              <a:t>(ID)</a:t>
+            </a:r>
+            <a:r>
+              <a:rPr lang="zh-CN" altLang="en-US" sz="1600" dirty="0"/>
+              <a:t>映射连接</a:t>
+            </a:r>
+            <a:r>
+              <a:rPr lang="en-US" altLang="zh-CN" sz="1600" dirty="0"/>
+              <a:t>(</a:t>
+            </a:r>
+            <a:r>
+              <a:rPr lang="en-US" altLang="zh-CN" sz="1600" dirty="0" err="1"/>
+              <a:t>ip</a:t>
+            </a:r>
+            <a:r>
+              <a:rPr lang="zh-CN" altLang="en-US" sz="1600" dirty="0"/>
+              <a:t>、</a:t>
+            </a:r>
+            <a:r>
+              <a:rPr lang="en-US" altLang="zh-CN" sz="1600" dirty="0"/>
+              <a:t>port)</a:t>
+            </a:r>
+            <a:r>
+              <a:rPr lang="zh-CN" altLang="en-US" sz="1600" dirty="0"/>
+              <a:t>，便于动态重启或者替换节点。</a:t>
+            </a:r>
+            <a:endParaRPr lang="en-US" altLang="zh-CN" sz="1600" dirty="0"/>
+          </a:p>
+          <a:p>
+            <a:r>
+              <a:rPr lang="zh-CN" altLang="en-US" sz="1600" dirty="0"/>
+              <a:t>作用：</a:t>
+            </a:r>
+            <a:endParaRPr lang="en-US" altLang="zh-CN" sz="1600" dirty="0"/>
+          </a:p>
+          <a:p>
+            <a:r>
+              <a:rPr lang="zh-CN" altLang="en-US" sz="1600" dirty="0"/>
+              <a:t>安全验证、过滤请求、访问路由、负载均衡</a:t>
             </a:r>
             <a:endParaRPr lang="en-US" altLang="zh-CN" sz="1600" dirty="0"/>
           </a:p>
@@ -5119,6 +5180,11 @@
               <a:rPr lang="en-US" altLang="zh-CN" sz="1600" dirty="0"/>
               <a:t>M*N-&gt;M+N</a:t>
             </a:r>
+            <a:r>
+              <a:rPr lang="zh-CN" altLang="en-US" sz="1600" dirty="0"/>
+              <a:t>（连接降维）</a:t>
+            </a:r>
+            <a:endParaRPr lang="en-US" altLang="zh-CN" sz="1600" dirty="0"/>
           </a:p>
           <a:p>
             <a:r>

</xml_diff>